<commit_message>
Session 2, Example Compile
</commit_message>
<xml_diff>
--- a/doc/מפגש 1.pptx
+++ b/doc/מפגש 1.pptx
@@ -8,6 +8,7 @@
     <p:sldId id="256" r:id="rId2"/>
     <p:sldId id="258" r:id="rId3"/>
     <p:sldId id="257" r:id="rId4"/>
+    <p:sldId id="259" r:id="rId5"/>
   </p:sldIdLst>
   <p:sldSz cx="12192000" cy="6858000"/>
   <p:notesSz cx="6858000" cy="9144000"/>
@@ -106,19 +107,71 @@
       </a:defRPr>
     </a:lvl9pPr>
   </p:defaultTextStyle>
+  <p:extLst>
+    <p:ext uri="{EFAFB233-063F-42B5-8137-9DF3F51BA10A}">
+      <p15:sldGuideLst xmlns:p15="http://schemas.microsoft.com/office/powerpoint/2012/main"/>
+    </p:ext>
+  </p:extLst>
 </p:presentation>
 </file>
 
 <file path=ppt/revisionInfo.xml><?xml version="1.0" encoding="utf-8"?>
 <p1510:revInfo xmlns:a="http://schemas.openxmlformats.org/drawingml/2006/main" xmlns:r="http://schemas.openxmlformats.org/officeDocument/2006/relationships" xmlns:p1510="http://schemas.microsoft.com/office/powerpoint/2015/10/main">
   <p1510:revLst>
-    <p1510:client id="{8F33C0A5-D2EA-4947-B6D5-09FA91E7C3EC}" v="10" dt="2022-08-07T07:19:58.225"/>
+    <p1510:client id="{113BE67A-DFDF-46CA-A3C0-E69BF8F71FD2}" v="1" dt="2022-08-30T13:59:00.667"/>
   </p1510:revLst>
 </p1510:revInfo>
 </file>
 
 <file path=ppt/changesInfos/changesInfo1.xml><?xml version="1.0" encoding="utf-8"?>
 <pc:chgInfo xmlns:a="http://schemas.openxmlformats.org/drawingml/2006/main" xmlns:r="http://schemas.openxmlformats.org/officeDocument/2006/relationships" xmlns:ac="http://schemas.microsoft.com/office/drawing/2013/main/command" xmlns:pc="http://schemas.microsoft.com/office/powerpoint/2013/main/command">
+  <pc:docChgLst>
+    <pc:chgData name="Amichai Ben David" userId="effe4c4b-4611-44ab-9d6b-f44045953326" providerId="ADAL" clId="{113BE67A-DFDF-46CA-A3C0-E69BF8F71FD2}"/>
+    <pc:docChg chg="undo custSel addSld modSld">
+      <pc:chgData name="Amichai Ben David" userId="effe4c4b-4611-44ab-9d6b-f44045953326" providerId="ADAL" clId="{113BE67A-DFDF-46CA-A3C0-E69BF8F71FD2}" dt="2022-08-30T16:12:11.710" v="178" actId="20577"/>
+      <pc:docMkLst>
+        <pc:docMk/>
+      </pc:docMkLst>
+      <pc:sldChg chg="modSp mod">
+        <pc:chgData name="Amichai Ben David" userId="effe4c4b-4611-44ab-9d6b-f44045953326" providerId="ADAL" clId="{113BE67A-DFDF-46CA-A3C0-E69BF8F71FD2}" dt="2022-08-30T14:11:16.425" v="176" actId="6549"/>
+        <pc:sldMkLst>
+          <pc:docMk/>
+          <pc:sldMk cId="1696779317" sldId="257"/>
+        </pc:sldMkLst>
+        <pc:spChg chg="mod">
+          <ac:chgData name="Amichai Ben David" userId="effe4c4b-4611-44ab-9d6b-f44045953326" providerId="ADAL" clId="{113BE67A-DFDF-46CA-A3C0-E69BF8F71FD2}" dt="2022-08-30T14:11:16.425" v="176" actId="6549"/>
+          <ac:spMkLst>
+            <pc:docMk/>
+            <pc:sldMk cId="1696779317" sldId="257"/>
+            <ac:spMk id="6" creationId="{E9B25978-84AB-9A2D-8AF1-E2390CC075B6}"/>
+          </ac:spMkLst>
+        </pc:spChg>
+      </pc:sldChg>
+      <pc:sldChg chg="modSp add mod">
+        <pc:chgData name="Amichai Ben David" userId="effe4c4b-4611-44ab-9d6b-f44045953326" providerId="ADAL" clId="{113BE67A-DFDF-46CA-A3C0-E69BF8F71FD2}" dt="2022-08-30T16:12:11.710" v="178" actId="20577"/>
+        <pc:sldMkLst>
+          <pc:docMk/>
+          <pc:sldMk cId="915754198" sldId="259"/>
+        </pc:sldMkLst>
+        <pc:spChg chg="mod">
+          <ac:chgData name="Amichai Ben David" userId="effe4c4b-4611-44ab-9d6b-f44045953326" providerId="ADAL" clId="{113BE67A-DFDF-46CA-A3C0-E69BF8F71FD2}" dt="2022-08-30T16:12:11.710" v="178" actId="20577"/>
+          <ac:spMkLst>
+            <pc:docMk/>
+            <pc:sldMk cId="915754198" sldId="259"/>
+            <ac:spMk id="2" creationId="{65E9FF07-AF49-3463-3E17-A65922784331}"/>
+          </ac:spMkLst>
+        </pc:spChg>
+        <pc:spChg chg="mod">
+          <ac:chgData name="Amichai Ben David" userId="effe4c4b-4611-44ab-9d6b-f44045953326" providerId="ADAL" clId="{113BE67A-DFDF-46CA-A3C0-E69BF8F71FD2}" dt="2022-08-30T16:10:42.895" v="177" actId="313"/>
+          <ac:spMkLst>
+            <pc:docMk/>
+            <pc:sldMk cId="915754198" sldId="259"/>
+            <ac:spMk id="6" creationId="{E9B25978-84AB-9A2D-8AF1-E2390CC075B6}"/>
+          </ac:spMkLst>
+        </pc:spChg>
+      </pc:sldChg>
+    </pc:docChg>
+  </pc:docChgLst>
   <pc:docChgLst>
     <pc:chgData name="Amichai Ben David" userId="effe4c4b-4611-44ab-9d6b-f44045953326" providerId="ADAL" clId="{8F33C0A5-D2EA-4947-B6D5-09FA91E7C3EC}"/>
     <pc:docChg chg="undo custSel addSld modSld sldOrd">
@@ -501,7 +554,7 @@
           <a:p>
             <a:fld id="{C86F9FF6-F32D-426F-B88C-9C6A73DF96C8}" type="datetimeFigureOut">
               <a:rPr lang="en-US" smtClean="0"/>
-              <a:t>8/7/2022</a:t>
+              <a:t>8/30/2022</a:t>
             </a:fld>
             <a:endParaRPr lang="en-US"/>
           </a:p>
@@ -835,7 +888,7 @@
           <a:p>
             <a:fld id="{C86F9FF6-F32D-426F-B88C-9C6A73DF96C8}" type="datetimeFigureOut">
               <a:rPr lang="en-US" smtClean="0"/>
-              <a:t>8/7/2022</a:t>
+              <a:t>8/30/2022</a:t>
             </a:fld>
             <a:endParaRPr lang="en-US"/>
           </a:p>
@@ -1113,7 +1166,7 @@
           <a:p>
             <a:fld id="{C86F9FF6-F32D-426F-B88C-9C6A73DF96C8}" type="datetimeFigureOut">
               <a:rPr lang="en-US" smtClean="0"/>
-              <a:t>8/7/2022</a:t>
+              <a:t>8/30/2022</a:t>
             </a:fld>
             <a:endParaRPr lang="en-US"/>
           </a:p>
@@ -1681,7 +1734,7 @@
           <a:p>
             <a:fld id="{C86F9FF6-F32D-426F-B88C-9C6A73DF96C8}" type="datetimeFigureOut">
               <a:rPr lang="en-US" smtClean="0"/>
-              <a:t>8/7/2022</a:t>
+              <a:t>8/30/2022</a:t>
             </a:fld>
             <a:endParaRPr lang="en-US"/>
           </a:p>
@@ -1959,7 +2012,7 @@
           <a:p>
             <a:fld id="{C86F9FF6-F32D-426F-B88C-9C6A73DF96C8}" type="datetimeFigureOut">
               <a:rPr lang="en-US" smtClean="0"/>
-              <a:t>8/7/2022</a:t>
+              <a:t>8/30/2022</a:t>
             </a:fld>
             <a:endParaRPr lang="en-US"/>
           </a:p>
@@ -2521,7 +2574,7 @@
           <a:p>
             <a:fld id="{C86F9FF6-F32D-426F-B88C-9C6A73DF96C8}" type="datetimeFigureOut">
               <a:rPr lang="en-US" smtClean="0"/>
-              <a:t>8/7/2022</a:t>
+              <a:t>8/30/2022</a:t>
             </a:fld>
             <a:endParaRPr lang="en-US"/>
           </a:p>
@@ -2848,7 +2901,7 @@
           <a:p>
             <a:fld id="{C86F9FF6-F32D-426F-B88C-9C6A73DF96C8}" type="datetimeFigureOut">
               <a:rPr lang="en-US" smtClean="0"/>
-              <a:t>8/7/2022</a:t>
+              <a:t>8/30/2022</a:t>
             </a:fld>
             <a:endParaRPr lang="en-US"/>
           </a:p>
@@ -3025,7 +3078,7 @@
           <a:p>
             <a:fld id="{C86F9FF6-F32D-426F-B88C-9C6A73DF96C8}" type="datetimeFigureOut">
               <a:rPr lang="en-US" smtClean="0"/>
-              <a:t>8/7/2022</a:t>
+              <a:t>8/30/2022</a:t>
             </a:fld>
             <a:endParaRPr lang="en-US"/>
           </a:p>
@@ -3263,7 +3316,7 @@
           <a:p>
             <a:fld id="{C86F9FF6-F32D-426F-B88C-9C6A73DF96C8}" type="datetimeFigureOut">
               <a:rPr lang="en-US" smtClean="0"/>
-              <a:t>8/7/2022</a:t>
+              <a:t>8/30/2022</a:t>
             </a:fld>
             <a:endParaRPr lang="en-US"/>
           </a:p>
@@ -3463,7 +3516,7 @@
           <a:p>
             <a:fld id="{C86F9FF6-F32D-426F-B88C-9C6A73DF96C8}" type="datetimeFigureOut">
               <a:rPr lang="en-US" smtClean="0"/>
-              <a:t>8/7/2022</a:t>
+              <a:t>8/30/2022</a:t>
             </a:fld>
             <a:endParaRPr lang="en-US"/>
           </a:p>
@@ -3739,7 +3792,7 @@
           <a:p>
             <a:fld id="{C86F9FF6-F32D-426F-B88C-9C6A73DF96C8}" type="datetimeFigureOut">
               <a:rPr lang="en-US" smtClean="0"/>
-              <a:t>8/7/2022</a:t>
+              <a:t>8/30/2022</a:t>
             </a:fld>
             <a:endParaRPr lang="en-US"/>
           </a:p>
@@ -4005,7 +4058,7 @@
           <a:p>
             <a:fld id="{C86F9FF6-F32D-426F-B88C-9C6A73DF96C8}" type="datetimeFigureOut">
               <a:rPr lang="en-US" smtClean="0"/>
-              <a:t>8/7/2022</a:t>
+              <a:t>8/30/2022</a:t>
             </a:fld>
             <a:endParaRPr lang="en-US"/>
           </a:p>
@@ -4379,7 +4432,7 @@
           <a:p>
             <a:fld id="{C86F9FF6-F32D-426F-B88C-9C6A73DF96C8}" type="datetimeFigureOut">
               <a:rPr lang="en-US" smtClean="0"/>
-              <a:t>8/7/2022</a:t>
+              <a:t>8/30/2022</a:t>
             </a:fld>
             <a:endParaRPr lang="en-US"/>
           </a:p>
@@ -4527,7 +4580,7 @@
           <a:p>
             <a:fld id="{C86F9FF6-F32D-426F-B88C-9C6A73DF96C8}" type="datetimeFigureOut">
               <a:rPr lang="en-US" smtClean="0"/>
-              <a:t>8/7/2022</a:t>
+              <a:t>8/30/2022</a:t>
             </a:fld>
             <a:endParaRPr lang="en-US"/>
           </a:p>
@@ -4652,7 +4705,7 @@
           <a:p>
             <a:fld id="{C86F9FF6-F32D-426F-B88C-9C6A73DF96C8}" type="datetimeFigureOut">
               <a:rPr lang="en-US" smtClean="0"/>
-              <a:t>8/7/2022</a:t>
+              <a:t>8/30/2022</a:t>
             </a:fld>
             <a:endParaRPr lang="en-US"/>
           </a:p>
@@ -4937,7 +4990,7 @@
           <a:p>
             <a:fld id="{C86F9FF6-F32D-426F-B88C-9C6A73DF96C8}" type="datetimeFigureOut">
               <a:rPr lang="en-US" smtClean="0"/>
-              <a:t>8/7/2022</a:t>
+              <a:t>8/30/2022</a:t>
             </a:fld>
             <a:endParaRPr lang="en-US"/>
           </a:p>
@@ -5261,7 +5314,7 @@
           <a:p>
             <a:fld id="{C86F9FF6-F32D-426F-B88C-9C6A73DF96C8}" type="datetimeFigureOut">
               <a:rPr lang="en-US" smtClean="0"/>
-              <a:t>8/7/2022</a:t>
+              <a:t>8/30/2022</a:t>
             </a:fld>
             <a:endParaRPr lang="en-US"/>
           </a:p>
@@ -5475,7 +5528,7 @@
           <a:p>
             <a:fld id="{C86F9FF6-F32D-426F-B88C-9C6A73DF96C8}" type="datetimeFigureOut">
               <a:rPr lang="en-US" smtClean="0"/>
-              <a:t>8/7/2022</a:t>
+              <a:t>8/30/2022</a:t>
             </a:fld>
             <a:endParaRPr lang="en-US"/>
           </a:p>
@@ -6642,10 +6695,6 @@
           </a:p>
           <a:p>
             <a:r>
-              <a:rPr lang="en-US" sz="2800" dirty="0"/>
-              <a:t> </a:t>
-            </a:r>
-            <a:r>
               <a:rPr lang="en-US" sz="2800" dirty="0" err="1"/>
               <a:t>gcc</a:t>
             </a:r>
@@ -6656,10 +6705,6 @@
           </a:p>
           <a:p>
             <a:r>
-              <a:rPr lang="en-US" sz="2800" dirty="0"/>
-              <a:t> </a:t>
-            </a:r>
-            <a:r>
               <a:rPr lang="en-US" sz="2800" dirty="0" err="1"/>
               <a:t>modelsim</a:t>
             </a:r>
@@ -6685,10 +6730,6 @@
             </a:r>
           </a:p>
           <a:p>
-            <a:r>
-              <a:rPr lang="en-US" sz="2800" dirty="0"/>
-              <a:t> </a:t>
-            </a:r>
             <a:r>
               <a:rPr lang="en-US" sz="2800" dirty="0" err="1"/>
               <a:t>quartus</a:t>
@@ -6704,6 +6745,134 @@
     <p:extLst>
       <p:ext uri="{BB962C8B-B14F-4D97-AF65-F5344CB8AC3E}">
         <p14:creationId xmlns:p14="http://schemas.microsoft.com/office/powerpoint/2010/main" val="1696779317"/>
+      </p:ext>
+    </p:extLst>
+  </p:cSld>
+  <p:clrMapOvr>
+    <a:masterClrMapping/>
+  </p:clrMapOvr>
+</p:sld>
+</file>
+
+<file path=ppt/slides/slide4.xml><?xml version="1.0" encoding="utf-8"?>
+<p:sld xmlns:a="http://schemas.openxmlformats.org/drawingml/2006/main" xmlns:r="http://schemas.openxmlformats.org/officeDocument/2006/relationships" xmlns:p="http://schemas.openxmlformats.org/presentationml/2006/main">
+  <p:cSld>
+    <p:spTree>
+      <p:nvGrpSpPr>
+        <p:cNvPr id="1" name=""/>
+        <p:cNvGrpSpPr/>
+        <p:nvPr/>
+      </p:nvGrpSpPr>
+      <p:grpSpPr>
+        <a:xfrm>
+          <a:off x="0" y="0"/>
+          <a:ext cx="0" cy="0"/>
+          <a:chOff x="0" y="0"/>
+          <a:chExt cx="0" cy="0"/>
+        </a:xfrm>
+      </p:grpSpPr>
+      <p:sp>
+        <p:nvSpPr>
+          <p:cNvPr id="2" name="Title 1">
+            <a:extLst>
+              <a:ext uri="{FF2B5EF4-FFF2-40B4-BE49-F238E27FC236}">
+                <a16:creationId xmlns:a16="http://schemas.microsoft.com/office/drawing/2014/main" id="{65E9FF07-AF49-3463-3E17-A65922784331}"/>
+              </a:ext>
+            </a:extLst>
+          </p:cNvPr>
+          <p:cNvSpPr>
+            <a:spLocks noGrp="1"/>
+          </p:cNvSpPr>
+          <p:nvPr>
+            <p:ph type="title"/>
+          </p:nvPr>
+        </p:nvSpPr>
+        <p:spPr/>
+        <p:txBody>
+          <a:bodyPr>
+            <a:normAutofit/>
+          </a:bodyPr>
+          <a:lstStyle/>
+          <a:p>
+            <a:r>
+              <a:rPr lang="en-US" sz="4400"/>
+              <a:t>Session 2:</a:t>
+            </a:r>
+            <a:br>
+              <a:rPr lang="en-US" sz="4400" dirty="0"/>
+            </a:br>
+            <a:r>
+              <a:rPr lang="en-US" dirty="0"/>
+              <a:t>RISCV Architecture: ISA + Block diagram</a:t>
+            </a:r>
+          </a:p>
+        </p:txBody>
+      </p:sp>
+      <p:sp>
+        <p:nvSpPr>
+          <p:cNvPr id="6" name="Content Placeholder 5">
+            <a:extLst>
+              <a:ext uri="{FF2B5EF4-FFF2-40B4-BE49-F238E27FC236}">
+                <a16:creationId xmlns:a16="http://schemas.microsoft.com/office/drawing/2014/main" id="{E9B25978-84AB-9A2D-8AF1-E2390CC075B6}"/>
+              </a:ext>
+            </a:extLst>
+          </p:cNvPr>
+          <p:cNvSpPr>
+            <a:spLocks noGrp="1"/>
+          </p:cNvSpPr>
+          <p:nvPr>
+            <p:ph idx="1"/>
+          </p:nvPr>
+        </p:nvSpPr>
+        <p:spPr>
+          <a:xfrm>
+            <a:off x="838200" y="2141537"/>
+            <a:ext cx="10515600" cy="3363524"/>
+          </a:xfrm>
+        </p:spPr>
+        <p:txBody>
+          <a:bodyPr>
+            <a:normAutofit/>
+          </a:bodyPr>
+          <a:lstStyle/>
+          <a:p>
+            <a:r>
+              <a:rPr lang="en-US" sz="2800" dirty="0"/>
+              <a:t>The ISA – Spec</a:t>
+            </a:r>
+          </a:p>
+          <a:p>
+            <a:pPr lvl="1"/>
+            <a:r>
+              <a:rPr lang="en-US" sz="2600" dirty="0"/>
+              <a:t>Unprivileged</a:t>
+            </a:r>
+          </a:p>
+          <a:p>
+            <a:pPr lvl="1"/>
+            <a:r>
+              <a:rPr lang="en-US" sz="2600" dirty="0"/>
+              <a:t>Privileged</a:t>
+            </a:r>
+          </a:p>
+          <a:p>
+            <a:r>
+              <a:rPr lang="en-US" sz="2800" dirty="0"/>
+              <a:t>C -&gt; Assembly -&gt; linker -&gt; assembler -&gt; machine code</a:t>
+            </a:r>
+          </a:p>
+          <a:p>
+            <a:r>
+              <a:rPr lang="en-US" sz="2800" dirty="0"/>
+              <a:t>RISCV Single-Cycle Block diagram</a:t>
+            </a:r>
+          </a:p>
+        </p:txBody>
+      </p:sp>
+    </p:spTree>
+    <p:extLst>
+      <p:ext uri="{BB962C8B-B14F-4D97-AF65-F5344CB8AC3E}">
+        <p14:creationId xmlns:p14="http://schemas.microsoft.com/office/powerpoint/2010/main" val="915754198"/>
       </p:ext>
     </p:extLst>
   </p:cSld>

</xml_diff>

<commit_message>
Session 3, Design SystemVerilog RISCV Core
</commit_message>
<xml_diff>
--- a/doc/מפגש 1.pptx
+++ b/doc/מפגש 1.pptx
@@ -9,6 +9,7 @@
     <p:sldId id="258" r:id="rId3"/>
     <p:sldId id="257" r:id="rId4"/>
     <p:sldId id="259" r:id="rId5"/>
+    <p:sldId id="260" r:id="rId6"/>
   </p:sldIdLst>
   <p:sldSz cx="12192000" cy="6858000"/>
   <p:notesSz cx="6858000" cy="9144000"/>
@@ -115,14 +116,6 @@
 </p:presentation>
 </file>
 
-<file path=ppt/revisionInfo.xml><?xml version="1.0" encoding="utf-8"?>
-<p1510:revInfo xmlns:a="http://schemas.openxmlformats.org/drawingml/2006/main" xmlns:r="http://schemas.openxmlformats.org/officeDocument/2006/relationships" xmlns:p1510="http://schemas.microsoft.com/office/powerpoint/2015/10/main">
-  <p1510:revLst>
-    <p1510:client id="{113BE67A-DFDF-46CA-A3C0-E69BF8F71FD2}" v="1" dt="2022-08-30T13:59:00.667"/>
-  </p1510:revLst>
-</p1510:revInfo>
-</file>
-
 <file path=ppt/changesInfos/changesInfo1.xml><?xml version="1.0" encoding="utf-8"?>
 <pc:chgInfo xmlns:a="http://schemas.openxmlformats.org/drawingml/2006/main" xmlns:r="http://schemas.openxmlformats.org/officeDocument/2006/relationships" xmlns:ac="http://schemas.microsoft.com/office/drawing/2013/main/command" xmlns:pc="http://schemas.microsoft.com/office/powerpoint/2013/main/command">
   <pc:docChgLst>
@@ -167,6 +160,38 @@
             <pc:docMk/>
             <pc:sldMk cId="915754198" sldId="259"/>
             <ac:spMk id="6" creationId="{E9B25978-84AB-9A2D-8AF1-E2390CC075B6}"/>
+          </ac:spMkLst>
+        </pc:spChg>
+      </pc:sldChg>
+    </pc:docChg>
+  </pc:docChgLst>
+  <pc:docChgLst>
+    <pc:chgData name="Amichai Ben David" userId="effe4c4b-4611-44ab-9d6b-f44045953326" providerId="ADAL" clId="{0EB661E0-E193-4001-AA0F-15E2371CFB20}"/>
+    <pc:docChg chg="undo custSel addSld modSld">
+      <pc:chgData name="Amichai Ben David" userId="effe4c4b-4611-44ab-9d6b-f44045953326" providerId="ADAL" clId="{0EB661E0-E193-4001-AA0F-15E2371CFB20}" dt="2022-09-07T13:13:42.776" v="138" actId="27636"/>
+      <pc:docMkLst>
+        <pc:docMk/>
+      </pc:docMkLst>
+      <pc:sldChg chg="modSp new mod">
+        <pc:chgData name="Amichai Ben David" userId="effe4c4b-4611-44ab-9d6b-f44045953326" providerId="ADAL" clId="{0EB661E0-E193-4001-AA0F-15E2371CFB20}" dt="2022-09-07T13:13:42.776" v="138" actId="27636"/>
+        <pc:sldMkLst>
+          <pc:docMk/>
+          <pc:sldMk cId="1150582434" sldId="260"/>
+        </pc:sldMkLst>
+        <pc:spChg chg="mod">
+          <ac:chgData name="Amichai Ben David" userId="effe4c4b-4611-44ab-9d6b-f44045953326" providerId="ADAL" clId="{0EB661E0-E193-4001-AA0F-15E2371CFB20}" dt="2022-09-07T13:04:21.445" v="4"/>
+          <ac:spMkLst>
+            <pc:docMk/>
+            <pc:sldMk cId="1150582434" sldId="260"/>
+            <ac:spMk id="2" creationId="{C976E612-5DEC-138E-1C0D-32DC4A4F7926}"/>
+          </ac:spMkLst>
+        </pc:spChg>
+        <pc:spChg chg="mod">
+          <ac:chgData name="Amichai Ben David" userId="effe4c4b-4611-44ab-9d6b-f44045953326" providerId="ADAL" clId="{0EB661E0-E193-4001-AA0F-15E2371CFB20}" dt="2022-09-07T13:13:42.776" v="138" actId="27636"/>
+          <ac:spMkLst>
+            <pc:docMk/>
+            <pc:sldMk cId="1150582434" sldId="260"/>
+            <ac:spMk id="3" creationId="{39A00B87-268A-56C0-C569-804FDA7CD620}"/>
           </ac:spMkLst>
         </pc:spChg>
       </pc:sldChg>
@@ -554,7 +579,7 @@
           <a:p>
             <a:fld id="{C86F9FF6-F32D-426F-B88C-9C6A73DF96C8}" type="datetimeFigureOut">
               <a:rPr lang="en-US" smtClean="0"/>
-              <a:t>8/30/2022</a:t>
+              <a:t>9/7/2022</a:t>
             </a:fld>
             <a:endParaRPr lang="en-US"/>
           </a:p>
@@ -888,7 +913,7 @@
           <a:p>
             <a:fld id="{C86F9FF6-F32D-426F-B88C-9C6A73DF96C8}" type="datetimeFigureOut">
               <a:rPr lang="en-US" smtClean="0"/>
-              <a:t>8/30/2022</a:t>
+              <a:t>9/7/2022</a:t>
             </a:fld>
             <a:endParaRPr lang="en-US"/>
           </a:p>
@@ -1166,7 +1191,7 @@
           <a:p>
             <a:fld id="{C86F9FF6-F32D-426F-B88C-9C6A73DF96C8}" type="datetimeFigureOut">
               <a:rPr lang="en-US" smtClean="0"/>
-              <a:t>8/30/2022</a:t>
+              <a:t>9/7/2022</a:t>
             </a:fld>
             <a:endParaRPr lang="en-US"/>
           </a:p>
@@ -1734,7 +1759,7 @@
           <a:p>
             <a:fld id="{C86F9FF6-F32D-426F-B88C-9C6A73DF96C8}" type="datetimeFigureOut">
               <a:rPr lang="en-US" smtClean="0"/>
-              <a:t>8/30/2022</a:t>
+              <a:t>9/7/2022</a:t>
             </a:fld>
             <a:endParaRPr lang="en-US"/>
           </a:p>
@@ -2012,7 +2037,7 @@
           <a:p>
             <a:fld id="{C86F9FF6-F32D-426F-B88C-9C6A73DF96C8}" type="datetimeFigureOut">
               <a:rPr lang="en-US" smtClean="0"/>
-              <a:t>8/30/2022</a:t>
+              <a:t>9/7/2022</a:t>
             </a:fld>
             <a:endParaRPr lang="en-US"/>
           </a:p>
@@ -2574,7 +2599,7 @@
           <a:p>
             <a:fld id="{C86F9FF6-F32D-426F-B88C-9C6A73DF96C8}" type="datetimeFigureOut">
               <a:rPr lang="en-US" smtClean="0"/>
-              <a:t>8/30/2022</a:t>
+              <a:t>9/7/2022</a:t>
             </a:fld>
             <a:endParaRPr lang="en-US"/>
           </a:p>
@@ -2901,7 +2926,7 @@
           <a:p>
             <a:fld id="{C86F9FF6-F32D-426F-B88C-9C6A73DF96C8}" type="datetimeFigureOut">
               <a:rPr lang="en-US" smtClean="0"/>
-              <a:t>8/30/2022</a:t>
+              <a:t>9/7/2022</a:t>
             </a:fld>
             <a:endParaRPr lang="en-US"/>
           </a:p>
@@ -3078,7 +3103,7 @@
           <a:p>
             <a:fld id="{C86F9FF6-F32D-426F-B88C-9C6A73DF96C8}" type="datetimeFigureOut">
               <a:rPr lang="en-US" smtClean="0"/>
-              <a:t>8/30/2022</a:t>
+              <a:t>9/7/2022</a:t>
             </a:fld>
             <a:endParaRPr lang="en-US"/>
           </a:p>
@@ -3316,7 +3341,7 @@
           <a:p>
             <a:fld id="{C86F9FF6-F32D-426F-B88C-9C6A73DF96C8}" type="datetimeFigureOut">
               <a:rPr lang="en-US" smtClean="0"/>
-              <a:t>8/30/2022</a:t>
+              <a:t>9/7/2022</a:t>
             </a:fld>
             <a:endParaRPr lang="en-US"/>
           </a:p>
@@ -3516,7 +3541,7 @@
           <a:p>
             <a:fld id="{C86F9FF6-F32D-426F-B88C-9C6A73DF96C8}" type="datetimeFigureOut">
               <a:rPr lang="en-US" smtClean="0"/>
-              <a:t>8/30/2022</a:t>
+              <a:t>9/7/2022</a:t>
             </a:fld>
             <a:endParaRPr lang="en-US"/>
           </a:p>
@@ -3792,7 +3817,7 @@
           <a:p>
             <a:fld id="{C86F9FF6-F32D-426F-B88C-9C6A73DF96C8}" type="datetimeFigureOut">
               <a:rPr lang="en-US" smtClean="0"/>
-              <a:t>8/30/2022</a:t>
+              <a:t>9/7/2022</a:t>
             </a:fld>
             <a:endParaRPr lang="en-US"/>
           </a:p>
@@ -4058,7 +4083,7 @@
           <a:p>
             <a:fld id="{C86F9FF6-F32D-426F-B88C-9C6A73DF96C8}" type="datetimeFigureOut">
               <a:rPr lang="en-US" smtClean="0"/>
-              <a:t>8/30/2022</a:t>
+              <a:t>9/7/2022</a:t>
             </a:fld>
             <a:endParaRPr lang="en-US"/>
           </a:p>
@@ -4432,7 +4457,7 @@
           <a:p>
             <a:fld id="{C86F9FF6-F32D-426F-B88C-9C6A73DF96C8}" type="datetimeFigureOut">
               <a:rPr lang="en-US" smtClean="0"/>
-              <a:t>8/30/2022</a:t>
+              <a:t>9/7/2022</a:t>
             </a:fld>
             <a:endParaRPr lang="en-US"/>
           </a:p>
@@ -4580,7 +4605,7 @@
           <a:p>
             <a:fld id="{C86F9FF6-F32D-426F-B88C-9C6A73DF96C8}" type="datetimeFigureOut">
               <a:rPr lang="en-US" smtClean="0"/>
-              <a:t>8/30/2022</a:t>
+              <a:t>9/7/2022</a:t>
             </a:fld>
             <a:endParaRPr lang="en-US"/>
           </a:p>
@@ -4705,7 +4730,7 @@
           <a:p>
             <a:fld id="{C86F9FF6-F32D-426F-B88C-9C6A73DF96C8}" type="datetimeFigureOut">
               <a:rPr lang="en-US" smtClean="0"/>
-              <a:t>8/30/2022</a:t>
+              <a:t>9/7/2022</a:t>
             </a:fld>
             <a:endParaRPr lang="en-US"/>
           </a:p>
@@ -4990,7 +5015,7 @@
           <a:p>
             <a:fld id="{C86F9FF6-F32D-426F-B88C-9C6A73DF96C8}" type="datetimeFigureOut">
               <a:rPr lang="en-US" smtClean="0"/>
-              <a:t>8/30/2022</a:t>
+              <a:t>9/7/2022</a:t>
             </a:fld>
             <a:endParaRPr lang="en-US"/>
           </a:p>
@@ -5314,7 +5339,7 @@
           <a:p>
             <a:fld id="{C86F9FF6-F32D-426F-B88C-9C6A73DF96C8}" type="datetimeFigureOut">
               <a:rPr lang="en-US" smtClean="0"/>
-              <a:t>8/30/2022</a:t>
+              <a:t>9/7/2022</a:t>
             </a:fld>
             <a:endParaRPr lang="en-US"/>
           </a:p>
@@ -5528,7 +5553,7 @@
           <a:p>
             <a:fld id="{C86F9FF6-F32D-426F-B88C-9C6A73DF96C8}" type="datetimeFigureOut">
               <a:rPr lang="en-US" smtClean="0"/>
-              <a:t>8/30/2022</a:t>
+              <a:t>9/7/2022</a:t>
             </a:fld>
             <a:endParaRPr lang="en-US"/>
           </a:p>
@@ -6795,7 +6820,7 @@
           <a:lstStyle/>
           <a:p>
             <a:r>
-              <a:rPr lang="en-US" sz="4400"/>
+              <a:rPr lang="en-US" sz="4400" dirty="0"/>
               <a:t>Session 2:</a:t>
             </a:r>
             <a:br>
@@ -6873,6 +6898,156 @@
     <p:extLst>
       <p:ext uri="{BB962C8B-B14F-4D97-AF65-F5344CB8AC3E}">
         <p14:creationId xmlns:p14="http://schemas.microsoft.com/office/powerpoint/2010/main" val="915754198"/>
+      </p:ext>
+    </p:extLst>
+  </p:cSld>
+  <p:clrMapOvr>
+    <a:masterClrMapping/>
+  </p:clrMapOvr>
+</p:sld>
+</file>
+
+<file path=ppt/slides/slide5.xml><?xml version="1.0" encoding="utf-8"?>
+<p:sld xmlns:a="http://schemas.openxmlformats.org/drawingml/2006/main" xmlns:r="http://schemas.openxmlformats.org/officeDocument/2006/relationships" xmlns:p="http://schemas.openxmlformats.org/presentationml/2006/main">
+  <p:cSld>
+    <p:spTree>
+      <p:nvGrpSpPr>
+        <p:cNvPr id="1" name=""/>
+        <p:cNvGrpSpPr/>
+        <p:nvPr/>
+      </p:nvGrpSpPr>
+      <p:grpSpPr>
+        <a:xfrm>
+          <a:off x="0" y="0"/>
+          <a:ext cx="0" cy="0"/>
+          <a:chOff x="0" y="0"/>
+          <a:chExt cx="0" cy="0"/>
+        </a:xfrm>
+      </p:grpSpPr>
+      <p:sp>
+        <p:nvSpPr>
+          <p:cNvPr id="2" name="Title 1">
+            <a:extLst>
+              <a:ext uri="{FF2B5EF4-FFF2-40B4-BE49-F238E27FC236}">
+                <a16:creationId xmlns:a16="http://schemas.microsoft.com/office/drawing/2014/main" id="{C976E612-5DEC-138E-1C0D-32DC4A4F7926}"/>
+              </a:ext>
+            </a:extLst>
+          </p:cNvPr>
+          <p:cNvSpPr>
+            <a:spLocks noGrp="1"/>
+          </p:cNvSpPr>
+          <p:nvPr>
+            <p:ph type="title"/>
+          </p:nvPr>
+        </p:nvSpPr>
+        <p:spPr/>
+        <p:txBody>
+          <a:bodyPr/>
+          <a:lstStyle/>
+          <a:p>
+            <a:r>
+              <a:rPr lang="en-US" sz="4400" dirty="0"/>
+              <a:t>Session 3:</a:t>
+            </a:r>
+            <a:br>
+              <a:rPr lang="en-US" sz="4400" dirty="0"/>
+            </a:br>
+            <a:r>
+              <a:rPr lang="en-US" sz="3600" dirty="0"/>
+              <a:t>RTL implementation</a:t>
+            </a:r>
+            <a:endParaRPr lang="en-US" dirty="0"/>
+          </a:p>
+        </p:txBody>
+      </p:sp>
+      <p:sp>
+        <p:nvSpPr>
+          <p:cNvPr id="3" name="Content Placeholder 2">
+            <a:extLst>
+              <a:ext uri="{FF2B5EF4-FFF2-40B4-BE49-F238E27FC236}">
+                <a16:creationId xmlns:a16="http://schemas.microsoft.com/office/drawing/2014/main" id="{39A00B87-268A-56C0-C569-804FDA7CD620}"/>
+              </a:ext>
+            </a:extLst>
+          </p:cNvPr>
+          <p:cNvSpPr>
+            <a:spLocks noGrp="1"/>
+          </p:cNvSpPr>
+          <p:nvPr>
+            <p:ph idx="1"/>
+          </p:nvPr>
+        </p:nvSpPr>
+        <p:spPr/>
+        <p:txBody>
+          <a:bodyPr>
+            <a:normAutofit fontScale="92500" lnSpcReduction="20000"/>
+          </a:bodyPr>
+          <a:lstStyle/>
+          <a:p>
+            <a:endParaRPr lang="en-US" sz="2400" dirty="0"/>
+          </a:p>
+          <a:p>
+            <a:r>
+              <a:rPr lang="en-US" sz="2400" dirty="0"/>
+              <a:t>Git Repository structure</a:t>
+            </a:r>
+          </a:p>
+          <a:p>
+            <a:r>
+              <a:rPr lang="en-US" sz="2400" dirty="0"/>
+              <a:t>Coding Style – System Verilog</a:t>
+            </a:r>
+          </a:p>
+          <a:p>
+            <a:pPr lvl="1"/>
+            <a:r>
+              <a:rPr lang="en-US" sz="2200" dirty="0"/>
+              <a:t>Defines</a:t>
+            </a:r>
+          </a:p>
+          <a:p>
+            <a:pPr lvl="1"/>
+            <a:r>
+              <a:rPr lang="en-US" sz="2200" dirty="0"/>
+              <a:t>Macros</a:t>
+            </a:r>
+          </a:p>
+          <a:p>
+            <a:pPr lvl="1"/>
+            <a:r>
+              <a:rPr lang="en-US" sz="2200" dirty="0"/>
+              <a:t>Package</a:t>
+            </a:r>
+          </a:p>
+          <a:p>
+            <a:pPr lvl="1"/>
+            <a:r>
+              <a:rPr lang="en-US" sz="2200" dirty="0" err="1"/>
+              <a:t>Strcuts</a:t>
+            </a:r>
+            <a:endParaRPr lang="en-US" sz="2200" dirty="0"/>
+          </a:p>
+          <a:p>
+            <a:r>
+              <a:rPr lang="en-US" sz="2400" dirty="0"/>
+              <a:t>RV32I Core implementation</a:t>
+            </a:r>
+          </a:p>
+          <a:p>
+            <a:pPr lvl="1"/>
+            <a:r>
+              <a:rPr lang="en-US" sz="2200" dirty="0"/>
+              <a:t>Single Cycle Core</a:t>
+            </a:r>
+          </a:p>
+          <a:p>
+            <a:endParaRPr lang="en-US" sz="2400" dirty="0"/>
+          </a:p>
+        </p:txBody>
+      </p:sp>
+    </p:spTree>
+    <p:extLst>
+      <p:ext uri="{BB962C8B-B14F-4D97-AF65-F5344CB8AC3E}">
+        <p14:creationId xmlns:p14="http://schemas.microsoft.com/office/powerpoint/2010/main" val="1150582434"/>
       </p:ext>
     </p:extLst>
   </p:cSld>

</xml_diff>